<commit_message>
Minor updates to all presentations
Mostly homogenisation of figures
</commit_message>
<xml_diff>
--- a/Pres/Intro.pptx
+++ b/Pres/Intro.pptx
@@ -3897,7 +3897,7 @@
           <a:p>
             <a:fld id="{E15B7D8E-2A20-4C0E-991C-872DBB7459A8}" type="datetimeFigureOut">
               <a:rPr lang="da-DK" smtClean="0"/>
-              <a:t>14-04-2018</a:t>
+              <a:t>16-04-2018</a:t>
             </a:fld>
             <a:endParaRPr lang="da-DK"/>
           </a:p>
@@ -4067,7 +4067,7 @@
           <a:p>
             <a:fld id="{E15B7D8E-2A20-4C0E-991C-872DBB7459A8}" type="datetimeFigureOut">
               <a:rPr lang="da-DK" smtClean="0"/>
-              <a:t>14-04-2018</a:t>
+              <a:t>16-04-2018</a:t>
             </a:fld>
             <a:endParaRPr lang="da-DK"/>
           </a:p>
@@ -4247,7 +4247,7 @@
           <a:p>
             <a:fld id="{E15B7D8E-2A20-4C0E-991C-872DBB7459A8}" type="datetimeFigureOut">
               <a:rPr lang="da-DK" smtClean="0"/>
-              <a:t>14-04-2018</a:t>
+              <a:t>16-04-2018</a:t>
             </a:fld>
             <a:endParaRPr lang="da-DK"/>
           </a:p>
@@ -4417,7 +4417,7 @@
           <a:p>
             <a:fld id="{E15B7D8E-2A20-4C0E-991C-872DBB7459A8}" type="datetimeFigureOut">
               <a:rPr lang="da-DK" smtClean="0"/>
-              <a:t>14-04-2018</a:t>
+              <a:t>16-04-2018</a:t>
             </a:fld>
             <a:endParaRPr lang="da-DK"/>
           </a:p>
@@ -4663,7 +4663,7 @@
           <a:p>
             <a:fld id="{E15B7D8E-2A20-4C0E-991C-872DBB7459A8}" type="datetimeFigureOut">
               <a:rPr lang="da-DK" smtClean="0"/>
-              <a:t>14-04-2018</a:t>
+              <a:t>16-04-2018</a:t>
             </a:fld>
             <a:endParaRPr lang="da-DK"/>
           </a:p>
@@ -4895,7 +4895,7 @@
           <a:p>
             <a:fld id="{E15B7D8E-2A20-4C0E-991C-872DBB7459A8}" type="datetimeFigureOut">
               <a:rPr lang="da-DK" smtClean="0"/>
-              <a:t>14-04-2018</a:t>
+              <a:t>16-04-2018</a:t>
             </a:fld>
             <a:endParaRPr lang="da-DK"/>
           </a:p>
@@ -5262,7 +5262,7 @@
           <a:p>
             <a:fld id="{E15B7D8E-2A20-4C0E-991C-872DBB7459A8}" type="datetimeFigureOut">
               <a:rPr lang="da-DK" smtClean="0"/>
-              <a:t>14-04-2018</a:t>
+              <a:t>16-04-2018</a:t>
             </a:fld>
             <a:endParaRPr lang="da-DK"/>
           </a:p>
@@ -5380,7 +5380,7 @@
           <a:p>
             <a:fld id="{E15B7D8E-2A20-4C0E-991C-872DBB7459A8}" type="datetimeFigureOut">
               <a:rPr lang="da-DK" smtClean="0"/>
-              <a:t>14-04-2018</a:t>
+              <a:t>16-04-2018</a:t>
             </a:fld>
             <a:endParaRPr lang="da-DK"/>
           </a:p>
@@ -5475,7 +5475,7 @@
           <a:p>
             <a:fld id="{E15B7D8E-2A20-4C0E-991C-872DBB7459A8}" type="datetimeFigureOut">
               <a:rPr lang="da-DK" smtClean="0"/>
-              <a:t>14-04-2018</a:t>
+              <a:t>16-04-2018</a:t>
             </a:fld>
             <a:endParaRPr lang="da-DK"/>
           </a:p>
@@ -5752,7 +5752,7 @@
           <a:p>
             <a:fld id="{E15B7D8E-2A20-4C0E-991C-872DBB7459A8}" type="datetimeFigureOut">
               <a:rPr lang="da-DK" smtClean="0"/>
-              <a:t>14-04-2018</a:t>
+              <a:t>16-04-2018</a:t>
             </a:fld>
             <a:endParaRPr lang="da-DK"/>
           </a:p>
@@ -6005,7 +6005,7 @@
           <a:p>
             <a:fld id="{E15B7D8E-2A20-4C0E-991C-872DBB7459A8}" type="datetimeFigureOut">
               <a:rPr lang="da-DK" smtClean="0"/>
-              <a:t>14-04-2018</a:t>
+              <a:t>16-04-2018</a:t>
             </a:fld>
             <a:endParaRPr lang="da-DK"/>
           </a:p>
@@ -6218,7 +6218,7 @@
           <a:p>
             <a:fld id="{E15B7D8E-2A20-4C0E-991C-872DBB7459A8}" type="datetimeFigureOut">
               <a:rPr lang="da-DK" smtClean="0"/>
-              <a:t>14-04-2018</a:t>
+              <a:t>16-04-2018</a:t>
             </a:fld>
             <a:endParaRPr lang="da-DK"/>
           </a:p>
@@ -7759,7 +7759,7 @@
         <p:spPr>
           <a:xfrm>
             <a:off x="838200" y="1825625"/>
-            <a:ext cx="8317832" cy="4351338"/>
+            <a:ext cx="10017034" cy="4351338"/>
           </a:xfrm>
         </p:spPr>
         <p:txBody>
@@ -7786,41 +7786,70 @@
             </a:r>
             <a:r>
               <a:rPr lang="da-DK" sz="3200" smtClean="0"/>
-              <a:t> (OOP)</a:t>
-            </a:r>
+              <a:t> (OOP</a:t>
+            </a:r>
+            <a:r>
+              <a:rPr lang="da-DK" sz="3200" smtClean="0"/>
+              <a:t>)</a:t>
+            </a:r>
+            <a:endParaRPr lang="da-DK" sz="2800" smtClean="0"/>
           </a:p>
           <a:p>
             <a:pPr lvl="1"/>
             <a:r>
               <a:rPr lang="da-DK" sz="2800" smtClean="0"/>
-              <a:t>Motivation</a:t>
-            </a:r>
+              <a:t>Brief recap of some key OOP </a:t>
+            </a:r>
+            <a:r>
+              <a:rPr lang="da-DK" sz="2800" smtClean="0"/>
+              <a:t>features (focus on inheritance)</a:t>
+            </a:r>
+            <a:endParaRPr lang="da-DK" sz="2800" smtClean="0"/>
           </a:p>
           <a:p>
             <a:pPr lvl="1"/>
             <a:r>
               <a:rPr lang="da-DK" sz="2800" smtClean="0"/>
-              <a:t>Brief recap of some key OOP features</a:t>
-            </a:r>
+              <a:t>OOP </a:t>
+            </a:r>
+            <a:r>
+              <a:rPr lang="da-DK" sz="2800" smtClean="0"/>
+              <a:t>principles </a:t>
+            </a:r>
+            <a:r>
+              <a:rPr lang="da-DK" sz="2800" smtClean="0"/>
+              <a:t>(focus on Dependency </a:t>
+            </a:r>
+            <a:r>
+              <a:rPr lang="da-DK" sz="2800" smtClean="0"/>
+              <a:t>Injection and </a:t>
+            </a:r>
+            <a:r>
+              <a:rPr lang="da-DK" sz="2800" smtClean="0"/>
+              <a:t>Open/Closed)</a:t>
+            </a:r>
+            <a:endParaRPr lang="da-DK" sz="2800" smtClean="0"/>
           </a:p>
           <a:p>
             <a:pPr lvl="1"/>
             <a:r>
               <a:rPr lang="da-DK" sz="2800" smtClean="0"/>
-              <a:t>OO principles (Dependency Injection and Open/Closed</a:t>
-            </a:r>
-          </a:p>
-          <a:p>
-            <a:pPr lvl="1"/>
+              <a:t>Closer look at some Design </a:t>
+            </a:r>
             <a:r>
               <a:rPr lang="da-DK" sz="2800" smtClean="0"/>
-              <a:t>Closer look at some Design Patterns</a:t>
-            </a:r>
+              <a:t>Patterns (as many as time permits)</a:t>
+            </a:r>
+            <a:endParaRPr lang="da-DK" sz="2800" smtClean="0"/>
           </a:p>
           <a:p>
             <a:r>
               <a:rPr lang="da-DK" sz="3200" smtClean="0"/>
-              <a:t>Approx. 3 x 45 minutes, with a couple of breaks along the way </a:t>
+              <a:t>About </a:t>
+            </a:r>
+            <a:r>
+              <a:rPr lang="da-DK" sz="3200" smtClean="0"/>
+              <a:t>3 x 45 minutes, with a couple of breaks along the way </a:t>
             </a:r>
             <a:r>
               <a:rPr lang="da-DK" sz="3200" smtClean="0">
@@ -7828,12 +7857,6 @@
               </a:rPr>
               <a:t></a:t>
             </a:r>
-            <a:endParaRPr lang="da-DK" sz="3200" smtClean="0"/>
-          </a:p>
-          <a:p>
-            <a:endParaRPr lang="da-DK" sz="3200" smtClean="0"/>
-          </a:p>
-          <a:p>
             <a:endParaRPr lang="da-DK" sz="3200" smtClean="0"/>
           </a:p>
           <a:p>
@@ -7926,7 +7949,7 @@
         <p:spPr>
           <a:xfrm>
             <a:off x="838200" y="1825625"/>
-            <a:ext cx="8540416" cy="4351338"/>
+            <a:ext cx="9520646" cy="4351338"/>
           </a:xfrm>
         </p:spPr>
         <p:txBody>
@@ -7965,7 +7988,11 @@
           <a:p>
             <a:r>
               <a:rPr lang="da-DK" sz="3200" smtClean="0"/>
-              <a:t>All materials will be available online</a:t>
+              <a:t>All materials will be available </a:t>
+            </a:r>
+            <a:r>
+              <a:rPr lang="da-DK" sz="3200" smtClean="0"/>
+              <a:t>online (GitHub)</a:t>
             </a:r>
             <a:endParaRPr lang="da-DK" sz="3200"/>
           </a:p>

</xml_diff>